<commit_message>
modified:   README.md 	new file:   abstract-foodenviro-set.txt 	new file:   csv-foodenviro-set.csv 	new file:   pmid-foodenviro-set.txt 	modified:   poster.pdf 	modified:   poster.pptx 	new file:   pubmed-foodenviro-set.txt
</commit_message>
<xml_diff>
--- a/poster.pptx
+++ b/poster.pptx
@@ -113,6 +113,18 @@
     </p:ext>
   </p:extLst>
 </p:presentation>
+</file>
+
+<file path=ppt/commentAuthors.xml><?xml version="1.0" encoding="utf-8"?>
+<p:cmAuthorLst xmlns:a="http://schemas.openxmlformats.org/drawingml/2006/main" xmlns:r="http://schemas.openxmlformats.org/officeDocument/2006/relationships" xmlns:p="http://schemas.openxmlformats.org/presentationml/2006/main">
+  <p:cmAuthor id="1" name="Angel" initials="A" lastIdx="3" clrIdx="0">
+    <p:extLst>
+      <p:ext uri="{19B8F6BF-5375-455C-9EA6-DF929625EA0E}">
+        <p15:presenceInfo xmlns:p15="http://schemas.microsoft.com/office/powerpoint/2012/main" userId="Angel" providerId="None"/>
+      </p:ext>
+    </p:extLst>
+  </p:cmAuthor>
+</p:cmAuthorLst>
 </file>
 
 <file path=ppt/notesMasters/notesMaster1.xml><?xml version="1.0" encoding="utf-8"?>
@@ -3644,8 +3656,8 @@
         </p:nvSpPr>
         <p:spPr>
           <a:xfrm>
-            <a:off x="859555" y="3265542"/>
-            <a:ext cx="21125837" cy="3980577"/>
+            <a:off x="859555" y="3321244"/>
+            <a:ext cx="21125837" cy="3652282"/>
           </a:xfrm>
           <a:prstGeom prst="rect">
             <a:avLst/>
@@ -3752,7 +3764,7 @@
                 <a:effectLst/>
                 <a:latin typeface="Fira Sans Condensed" panose="020B0503050000020004" pitchFamily="34" charset="0"/>
               </a:rPr>
-              <a:t>2,3,4</a:t>
+              <a:t>1,2,4</a:t>
             </a:r>
             <a:r>
               <a:rPr lang="en-US" sz="3200" b="0" i="0" dirty="0">
@@ -3792,7 +3804,7 @@
                 <a:effectLst/>
                 <a:latin typeface="Fira Sans Condensed" panose="020B0503050000020004" pitchFamily="34" charset="0"/>
               </a:rPr>
-              <a:t>2,3,5</a:t>
+              <a:t>1,2,5</a:t>
             </a:r>
             <a:r>
               <a:rPr lang="en-US" sz="3200" b="0" i="0" dirty="0">
@@ -3835,6 +3847,15 @@
               <a:t> </a:t>
             </a:r>
             <a:r>
+              <a:rPr lang="en-US" sz="3200" baseline="30000" dirty="0">
+                <a:solidFill>
+                  <a:srgbClr val="000000"/>
+                </a:solidFill>
+                <a:latin typeface="Fira Sans Condensed" panose="020B0503050000020004" pitchFamily="34" charset="0"/>
+              </a:rPr>
+              <a:t>1,2</a:t>
+            </a:r>
+            <a:r>
               <a:rPr lang="en-US" sz="3200" b="0" i="0" baseline="30000" dirty="0">
                 <a:solidFill>
                   <a:srgbClr val="000000"/>
@@ -3842,7 +3863,7 @@
                 <a:effectLst/>
                 <a:latin typeface="Fira Sans Condensed" panose="020B0503050000020004" pitchFamily="34" charset="0"/>
               </a:rPr>
-              <a:t>2,3,6</a:t>
+              <a:t>,6</a:t>
             </a:r>
             <a:r>
               <a:rPr lang="en-US" sz="3200" b="0" i="0" dirty="0">
@@ -3852,7 +3873,7 @@
                 <a:effectLst/>
                 <a:latin typeface="Fira Sans Condensed" panose="020B0503050000020004" pitchFamily="34" charset="0"/>
               </a:rPr>
-              <a:t>; Angel </a:t>
+              <a:t>; Angel M. </a:t>
             </a:r>
             <a:r>
               <a:rPr lang="en-US" sz="3200" b="1" i="1" dirty="0" err="1">
@@ -3882,20 +3903,8 @@
                 <a:effectLst/>
                 <a:latin typeface="Fira Sans Condensed" panose="020B0503050000020004" pitchFamily="34" charset="0"/>
               </a:rPr>
-              <a:t>2,3</a:t>
-            </a:r>
-          </a:p>
-          <a:p>
-            <a:pPr algn="l">
-              <a:buNone/>
-            </a:pPr>
-            <a:endParaRPr lang="en-US" sz="3200" b="0" i="0" baseline="30000" dirty="0">
-              <a:solidFill>
-                <a:srgbClr val="000000"/>
-              </a:solidFill>
-              <a:effectLst/>
-              <a:latin typeface="Fira Sans Condensed" panose="020B0503050000020004" pitchFamily="34" charset="0"/>
-            </a:endParaRPr>
+              <a:t>1,2</a:t>
+            </a:r>
           </a:p>
           <a:p>
             <a:pPr algn="l">
@@ -3910,9 +3919,7 @@
             </a:endParaRPr>
           </a:p>
           <a:p>
-            <a:pPr algn="just">
-              <a:buNone/>
-            </a:pPr>
+            <a:pPr algn="just"/>
             <a:r>
               <a:rPr lang="en-US" sz="2400" b="0" i="0" baseline="30000" dirty="0">
                 <a:solidFill>
@@ -3931,7 +3938,7 @@
                 <a:effectLst/>
                 <a:latin typeface="Fira Sans Condensed" panose="020B0503050000020004" pitchFamily="34" charset="0"/>
               </a:rPr>
-              <a:t>Department of Social Medicine and Public Health, Faculty of Public Health, Medical University of</a:t>
+              <a:t>Environmental Health Division, Research Institute at Medical University of Plovdiv, Medical</a:t>
             </a:r>
             <a:r>
               <a:rPr lang="bg-BG" sz="2400" b="0" i="0" dirty="0">
@@ -3951,8 +3958,15 @@
                 <a:effectLst/>
                 <a:latin typeface="Fira Sans Condensed" panose="020B0503050000020004" pitchFamily="34" charset="0"/>
               </a:rPr>
-              <a:t>Plovdiv, Plovdiv, Bulgaria;</a:t>
-            </a:r>
+              <a:t>University of Plovdiv, Plovdiv, Bulgaria;</a:t>
+            </a:r>
+            <a:endParaRPr lang="en-US" sz="2400" b="0" i="0" baseline="30000" dirty="0">
+              <a:solidFill>
+                <a:srgbClr val="000000"/>
+              </a:solidFill>
+              <a:effectLst/>
+              <a:latin typeface="Fira Sans Condensed" panose="020B0503050000020004" pitchFamily="34" charset="0"/>
+            </a:endParaRPr>
           </a:p>
           <a:p>
             <a:pPr algn="just">
@@ -4020,9 +4034,7 @@
             </a:r>
           </a:p>
           <a:p>
-            <a:pPr algn="just">
-              <a:buNone/>
-            </a:pPr>
+            <a:pPr algn="just"/>
             <a:r>
               <a:rPr lang="en-US" sz="2400" b="0" i="0" baseline="30000" dirty="0">
                 <a:solidFill>
@@ -4041,7 +4053,7 @@
                 <a:effectLst/>
                 <a:latin typeface="Fira Sans Condensed" panose="020B0503050000020004" pitchFamily="34" charset="0"/>
               </a:rPr>
-              <a:t>Environmental Health Division, Research Institute at Medical University of Plovdiv, Medical</a:t>
+              <a:t>Department of Social Medicine and Public Health, Faculty of Public Health, Medical University of</a:t>
             </a:r>
             <a:r>
               <a:rPr lang="bg-BG" sz="2400" b="0" i="0" dirty="0">
@@ -4061,7 +4073,7 @@
                 <a:effectLst/>
                 <a:latin typeface="Fira Sans Condensed" panose="020B0503050000020004" pitchFamily="34" charset="0"/>
               </a:rPr>
-              <a:t>University of Plovdiv, Plovdiv, Bulgaria;</a:t>
+              <a:t>Plovdiv, Plovdiv, Bulgaria;</a:t>
             </a:r>
           </a:p>
           <a:p>
@@ -4308,7 +4320,7 @@
         </p:nvSpPr>
         <p:spPr>
           <a:xfrm>
-            <a:off x="545073" y="19875066"/>
+            <a:off x="545072" y="20333526"/>
             <a:ext cx="8834899" cy="1203278"/>
           </a:xfrm>
           <a:prstGeom prst="rect">
@@ -4396,7 +4408,7 @@
         </p:nvSpPr>
         <p:spPr>
           <a:xfrm>
-            <a:off x="545073" y="25970852"/>
+            <a:off x="545072" y="25654887"/>
             <a:ext cx="8834899" cy="1203278"/>
           </a:xfrm>
           <a:prstGeom prst="rect">
@@ -4484,7 +4496,7 @@
         </p:nvSpPr>
         <p:spPr>
           <a:xfrm>
-            <a:off x="12599987" y="19875066"/>
+            <a:off x="12922526" y="19673384"/>
             <a:ext cx="8834899" cy="1203278"/>
           </a:xfrm>
           <a:prstGeom prst="rect">
@@ -4558,7 +4570,7 @@
         </p:nvSpPr>
         <p:spPr>
           <a:xfrm>
-            <a:off x="12922526" y="27410688"/>
+            <a:off x="13049584" y="27242502"/>
             <a:ext cx="8834899" cy="1203278"/>
           </a:xfrm>
           <a:prstGeom prst="rect">
@@ -4646,7 +4658,7 @@
         </p:nvSpPr>
         <p:spPr>
           <a:xfrm>
-            <a:off x="13049584" y="33192280"/>
+            <a:off x="13049584" y="32622687"/>
             <a:ext cx="6716662" cy="1321364"/>
           </a:xfrm>
           <a:prstGeom prst="rect">
@@ -4857,8 +4869,8 @@
         </p:nvSpPr>
         <p:spPr>
           <a:xfrm>
-            <a:off x="800100" y="8069943"/>
-            <a:ext cx="11477351" cy="6740307"/>
+            <a:off x="545071" y="8254061"/>
+            <a:ext cx="12104075" cy="7848302"/>
           </a:xfrm>
           <a:prstGeom prst="rect">
             <a:avLst/>
@@ -4885,9 +4897,12 @@
             <a:pPr algn="just">
               <a:buNone/>
             </a:pPr>
-            <a:endParaRPr lang="en-US" sz="3600" dirty="0">
-              <a:latin typeface="Fira Sans" panose="020B0503050000020004" pitchFamily="34" charset="0"/>
-            </a:endParaRPr>
+            <a:r>
+              <a:rPr lang="en-US" sz="3600" dirty="0">
+                <a:latin typeface="Fira Sans" panose="020B0503050000020004" pitchFamily="34" charset="0"/>
+              </a:rPr>
+              <a:t>The physical food environment in cities represents the geographical access to various food establishments and shops, availability of different foods, reflects the opportunities and conditions influence people's food choices and nutritional status</a:t>
+            </a:r>
           </a:p>
           <a:p>
             <a:pPr algn="just">
@@ -4897,7 +4912,7 @@
               <a:rPr lang="en-US" sz="3600" dirty="0">
                 <a:latin typeface="Fira Sans" panose="020B0503050000020004" pitchFamily="34" charset="0"/>
               </a:rPr>
-              <a:t>The urban food environment plays a critical role in shaping dietary behaviors and long-term health outcomes. It encompasses factors such as the availability, accessibility, affordability, and quality of food across neighborhoods. As cities grow and dietary patterns shift, understanding how local food environments influence population health is increasingly important. This knowledge can inform both public health strategies and urban policy aimed at reducing health inequalities and promoting healthier lifestyles.</a:t>
+              <a:t> plays a critical role in shaping dietary behaviors and long-term health outcomes. It encompasses factors such as the availability, accessibility, affordability, and quality of food across neighborhoods. As cities grow and dietary patterns shift, understanding how local food environments influence population health is increasingly important. This knowledge can inform both public health strategies and urban policy aimed at reducing health inequalities and promoting healthier lifestyles.</a:t>
             </a:r>
             <a:endParaRPr lang="bg-BG" dirty="0">
               <a:latin typeface="Fira Sans" panose="020B0503050000020004" pitchFamily="34" charset="0"/>
@@ -4919,8 +4934,8 @@
         </p:nvSpPr>
         <p:spPr>
           <a:xfrm>
-            <a:off x="750939" y="16165865"/>
-            <a:ext cx="11477351" cy="3416320"/>
+            <a:off x="495912" y="17672391"/>
+            <a:ext cx="12054914" cy="2308324"/>
           </a:xfrm>
           <a:prstGeom prst="rect">
             <a:avLst/>
@@ -4947,14 +4962,6 @@
             <a:pPr algn="just">
               <a:buNone/>
             </a:pPr>
-            <a:endParaRPr lang="en-US" sz="3600" dirty="0">
-              <a:latin typeface="Fira Sans" panose="020B0503050000020004" pitchFamily="34" charset="0"/>
-            </a:endParaRPr>
-          </a:p>
-          <a:p>
-            <a:pPr algn="just">
-              <a:buNone/>
-            </a:pPr>
             <a:r>
               <a:rPr lang="en-US" sz="3600" dirty="0">
                 <a:latin typeface="Fira Sans" panose="020B0503050000020004" pitchFamily="34" charset="0"/>
@@ -4981,7 +4988,7 @@
         </p:nvSpPr>
         <p:spPr>
           <a:xfrm>
-            <a:off x="495913" y="15103130"/>
+            <a:off x="495912" y="16455318"/>
             <a:ext cx="8834899" cy="1203278"/>
           </a:xfrm>
           <a:prstGeom prst="rect">
@@ -5069,8 +5076,8 @@
         </p:nvSpPr>
         <p:spPr>
           <a:xfrm>
-            <a:off x="800100" y="20937800"/>
-            <a:ext cx="11428190" cy="4524315"/>
+            <a:off x="545071" y="21544721"/>
+            <a:ext cx="11995367" cy="3416320"/>
           </a:xfrm>
           <a:prstGeom prst="rect">
             <a:avLst/>
@@ -5097,12 +5104,6 @@
             <a:pPr algn="just">
               <a:buNone/>
             </a:pPr>
-            <a:endParaRPr lang="en-US" sz="3600" dirty="0"/>
-          </a:p>
-          <a:p>
-            <a:pPr algn="just">
-              <a:buNone/>
-            </a:pPr>
             <a:r>
               <a:rPr lang="en-US" sz="3600" dirty="0">
                 <a:latin typeface="Fira Sans" panose="020B0503050000020004" pitchFamily="34" charset="0"/>
@@ -5162,55 +5163,21 @@
               <a:rPr lang="en-US" sz="3600" dirty="0">
                 <a:latin typeface="Fira Sans" panose="020B0503050000020004" pitchFamily="34" charset="0"/>
               </a:rPr>
-              <a:t>.</a:t>
-            </a:r>
-            <a:endParaRPr lang="bg-BG" dirty="0">
+              <a:t>. </a:t>
+            </a:r>
+            <a:endParaRPr lang="bg-BG" i="1" dirty="0">
+              <a:effectLst>
+                <a:outerShdw blurRad="38100" dist="38100" dir="2700000" algn="tl">
+                  <a:srgbClr val="000000">
+                    <a:alpha val="43137"/>
+                  </a:srgbClr>
+                </a:outerShdw>
+              </a:effectLst>
               <a:latin typeface="Fira Sans" panose="020B0503050000020004" pitchFamily="34" charset="0"/>
             </a:endParaRPr>
           </a:p>
         </p:txBody>
       </p:sp>
-      <p:pic>
-        <p:nvPicPr>
-          <p:cNvPr id="2" name="Picture 1">
-            <a:extLst>
-              <a:ext uri="{FF2B5EF4-FFF2-40B4-BE49-F238E27FC236}">
-                <a16:creationId xmlns:a16="http://schemas.microsoft.com/office/drawing/2014/main" id="{8B5AA5E6-BA76-B236-7A2D-B7ADEA3861DB}"/>
-              </a:ext>
-            </a:extLst>
-          </p:cNvPr>
-          <p:cNvPicPr>
-            <a:picLocks noChangeAspect="1"/>
-          </p:cNvPicPr>
-          <p:nvPr/>
-        </p:nvPicPr>
-        <p:blipFill>
-          <a:blip r:embed="rId4">
-            <a:extLst>
-              <a:ext uri="{28A0092B-C50C-407E-A947-70E740481C1C}">
-                <a14:useLocalDpi xmlns:a14="http://schemas.microsoft.com/office/drawing/2010/main" val="0"/>
-              </a:ext>
-            </a:extLst>
-          </a:blip>
-          <a:srcRect/>
-          <a:stretch>
-            <a:fillRect/>
-          </a:stretch>
-        </p:blipFill>
-        <p:spPr bwMode="auto">
-          <a:xfrm>
-            <a:off x="859555" y="356723"/>
-            <a:ext cx="2747637" cy="2638411"/>
-          </a:xfrm>
-          <a:prstGeom prst="rect">
-            <a:avLst/>
-          </a:prstGeom>
-          <a:noFill/>
-          <a:ln>
-            <a:noFill/>
-          </a:ln>
-        </p:spPr>
-      </p:pic>
       <p:pic>
         <p:nvPicPr>
           <p:cNvPr id="6" name="Picture 5" descr="A black book with red text&#10;&#10;AI-generated content may be incorrect.">
@@ -5226,7 +5193,7 @@
           <p:nvPr/>
         </p:nvPicPr>
         <p:blipFill>
-          <a:blip r:embed="rId5">
+          <a:blip r:embed="rId4">
             <a:extLst>
               <a:ext uri="{28A0092B-C50C-407E-A947-70E740481C1C}">
                 <a14:useLocalDpi xmlns:a14="http://schemas.microsoft.com/office/drawing/2010/main" val="0"/>
@@ -5260,8 +5227,8 @@
         </p:nvSpPr>
         <p:spPr>
           <a:xfrm>
-            <a:off x="800100" y="27003548"/>
-            <a:ext cx="11428190" cy="2862322"/>
+            <a:off x="545071" y="26858165"/>
+            <a:ext cx="11428190" cy="2308324"/>
           </a:xfrm>
           <a:prstGeom prst="rect">
             <a:avLst/>
@@ -5284,12 +5251,6 @@
             <a:spAutoFit/>
           </a:bodyPr>
           <a:lstStyle/>
-          <a:p>
-            <a:pPr algn="just">
-              <a:buNone/>
-            </a:pPr>
-            <a:endParaRPr lang="en-US" sz="3600" dirty="0"/>
-          </a:p>
           <a:p>
             <a:pPr>
               <a:buNone/>
@@ -5956,7 +5917,7 @@
           <p:nvPr/>
         </p:nvPicPr>
         <p:blipFill>
-          <a:blip r:embed="rId6"/>
+          <a:blip r:embed="rId5"/>
           <a:stretch>
             <a:fillRect/>
           </a:stretch>
@@ -5986,7 +5947,7 @@
           <p:nvPr/>
         </p:nvPicPr>
         <p:blipFill>
-          <a:blip r:embed="rId7"/>
+          <a:blip r:embed="rId6"/>
           <a:stretch>
             <a:fillRect/>
           </a:stretch>
@@ -6016,7 +5977,7 @@
           <p:nvPr/>
         </p:nvPicPr>
         <p:blipFill>
-          <a:blip r:embed="rId8"/>
+          <a:blip r:embed="rId7"/>
           <a:stretch>
             <a:fillRect/>
           </a:stretch>
@@ -6046,7 +6007,7 @@
           <p:nvPr/>
         </p:nvPicPr>
         <p:blipFill>
-          <a:blip r:embed="rId9"/>
+          <a:blip r:embed="rId8"/>
           <a:stretch>
             <a:fillRect/>
           </a:stretch>
@@ -6076,6 +6037,47 @@
           <p:nvPr/>
         </p:nvPicPr>
         <p:blipFill>
+          <a:blip r:embed="rId9">
+            <a:extLst>
+              <a:ext uri="{28A0092B-C50C-407E-A947-70E740481C1C}">
+                <a14:useLocalDpi xmlns:a14="http://schemas.microsoft.com/office/drawing/2010/main" val="0"/>
+              </a:ext>
+            </a:extLst>
+          </a:blip>
+          <a:stretch>
+            <a:fillRect/>
+          </a:stretch>
+        </p:blipFill>
+        <p:spPr>
+          <a:xfrm>
+            <a:off x="19954970" y="32169113"/>
+            <a:ext cx="2344531" cy="2344531"/>
+          </a:xfrm>
+          <a:prstGeom prst="rect">
+            <a:avLst/>
+          </a:prstGeom>
+          <a:ln>
+            <a:solidFill>
+              <a:schemeClr val="tx1"/>
+            </a:solidFill>
+          </a:ln>
+        </p:spPr>
+      </p:pic>
+      <p:pic>
+        <p:nvPicPr>
+          <p:cNvPr id="8" name="Picture 7">
+            <a:extLst>
+              <a:ext uri="{FF2B5EF4-FFF2-40B4-BE49-F238E27FC236}">
+                <a16:creationId xmlns:a16="http://schemas.microsoft.com/office/drawing/2014/main" id="{C489C233-4A3E-4F30-A32C-0FCA8186637B}"/>
+              </a:ext>
+            </a:extLst>
+          </p:cNvPr>
+          <p:cNvPicPr>
+            <a:picLocks noChangeAspect="1"/>
+          </p:cNvPicPr>
+          <p:nvPr/>
+        </p:nvPicPr>
+        <p:blipFill>
           <a:blip r:embed="rId10">
             <a:extLst>
               <a:ext uri="{28A0092B-C50C-407E-A947-70E740481C1C}">
@@ -6089,19 +6091,454 @@
         </p:blipFill>
         <p:spPr>
           <a:xfrm>
-            <a:off x="20256752" y="32548682"/>
-            <a:ext cx="2344531" cy="2344531"/>
+            <a:off x="859555" y="573802"/>
+            <a:ext cx="2691740" cy="2691740"/>
           </a:xfrm>
           <a:prstGeom prst="rect">
             <a:avLst/>
           </a:prstGeom>
+        </p:spPr>
+      </p:pic>
+      <p:sp>
+        <p:nvSpPr>
+          <p:cNvPr id="34" name="TextBox 33">
+            <a:extLst>
+              <a:ext uri="{FF2B5EF4-FFF2-40B4-BE49-F238E27FC236}">
+                <a16:creationId xmlns:a16="http://schemas.microsoft.com/office/drawing/2014/main" id="{03D006FD-4994-4B32-A141-259BFF337A62}"/>
+              </a:ext>
+            </a:extLst>
+          </p:cNvPr>
+          <p:cNvSpPr txBox="1"/>
+          <p:nvPr/>
+        </p:nvSpPr>
+        <p:spPr>
+          <a:xfrm>
+            <a:off x="495912" y="34831425"/>
+            <a:ext cx="24340419" cy="1015663"/>
+          </a:xfrm>
+          <a:prstGeom prst="rect">
+            <a:avLst/>
+          </a:prstGeom>
+          <a:noFill/>
+        </p:spPr>
+        <p:txBody>
+          <a:bodyPr wrap="square">
+            <a:spAutoFit/>
+          </a:bodyPr>
+          <a:lstStyle/>
+          <a:p>
+            <a:pPr algn="ctr"/>
+            <a:r>
+              <a:rPr lang="ru-RU" sz="2000" dirty="0">
+                <a:latin typeface="Fira Sans" panose="020B0503050000020004" pitchFamily="34" charset="0"/>
+                <a:ea typeface="Fira Code" pitchFamily="1" charset="0"/>
+                <a:cs typeface="Fira Code" pitchFamily="1" charset="0"/>
+              </a:rPr>
+              <a:t>Договор №BG-RRP-2.004-007C01  "</a:t>
+            </a:r>
+            <a:r>
+              <a:rPr lang="ru-RU" sz="2000" dirty="0" err="1">
+                <a:latin typeface="Fira Sans" panose="020B0503050000020004" pitchFamily="34" charset="0"/>
+                <a:ea typeface="Fira Code" pitchFamily="1" charset="0"/>
+                <a:cs typeface="Fira Code" pitchFamily="1" charset="0"/>
+              </a:rPr>
+              <a:t>Програма</a:t>
+            </a:r>
+            <a:r>
+              <a:rPr lang="ru-RU" sz="2000" dirty="0">
+                <a:latin typeface="Fira Sans" panose="020B0503050000020004" pitchFamily="34" charset="0"/>
+                <a:ea typeface="Fira Code" pitchFamily="1" charset="0"/>
+                <a:cs typeface="Fira Code" pitchFamily="1" charset="0"/>
+              </a:rPr>
+              <a:t> за стратегически </a:t>
+            </a:r>
+            <a:r>
+              <a:rPr lang="ru-RU" sz="2000" dirty="0" err="1">
+                <a:latin typeface="Fira Sans" panose="020B0503050000020004" pitchFamily="34" charset="0"/>
+                <a:ea typeface="Fira Code" pitchFamily="1" charset="0"/>
+                <a:cs typeface="Fira Code" pitchFamily="1" charset="0"/>
+              </a:rPr>
+              <a:t>изследвания</a:t>
+            </a:r>
+            <a:r>
+              <a:rPr lang="ru-RU" sz="2000" dirty="0">
+                <a:latin typeface="Fira Sans" panose="020B0503050000020004" pitchFamily="34" charset="0"/>
+                <a:ea typeface="Fira Code" pitchFamily="1" charset="0"/>
+                <a:cs typeface="Fira Code" pitchFamily="1" charset="0"/>
+              </a:rPr>
+              <a:t> и </a:t>
+            </a:r>
+            <a:r>
+              <a:rPr lang="ru-RU" sz="2000" dirty="0" err="1">
+                <a:latin typeface="Fira Sans" panose="020B0503050000020004" pitchFamily="34" charset="0"/>
+                <a:ea typeface="Fira Code" pitchFamily="1" charset="0"/>
+                <a:cs typeface="Fira Code" pitchFamily="1" charset="0"/>
+              </a:rPr>
+              <a:t>иновации</a:t>
+            </a:r>
+            <a:r>
+              <a:rPr lang="ru-RU" sz="2000" dirty="0">
+                <a:latin typeface="Fira Sans" panose="020B0503050000020004" pitchFamily="34" charset="0"/>
+                <a:ea typeface="Fira Code" pitchFamily="1" charset="0"/>
+                <a:cs typeface="Fira Code" pitchFamily="1" charset="0"/>
+              </a:rPr>
+              <a:t> на МУ- Пловдив (ПСНИИР-МУП)", </a:t>
+            </a:r>
+          </a:p>
+          <a:p>
+            <a:pPr algn="ctr"/>
+            <a:r>
+              <a:rPr lang="ru-RU" sz="2000" dirty="0" err="1">
+                <a:latin typeface="Fira Sans" panose="020B0503050000020004" pitchFamily="34" charset="0"/>
+                <a:ea typeface="Fira Code" pitchFamily="1" charset="0"/>
+                <a:cs typeface="Fira Code" pitchFamily="1" charset="0"/>
+              </a:rPr>
+              <a:t>Стълб</a:t>
+            </a:r>
+            <a:r>
+              <a:rPr lang="ru-RU" sz="2000" dirty="0">
+                <a:latin typeface="Fira Sans" panose="020B0503050000020004" pitchFamily="34" charset="0"/>
+                <a:ea typeface="Fira Code" pitchFamily="1" charset="0"/>
+                <a:cs typeface="Fira Code" pitchFamily="1" charset="0"/>
+              </a:rPr>
+              <a:t> 2: </a:t>
+            </a:r>
+            <a:r>
+              <a:rPr lang="ru-RU" sz="2000" dirty="0" err="1">
+                <a:latin typeface="Fira Sans" panose="020B0503050000020004" pitchFamily="34" charset="0"/>
+                <a:ea typeface="Fira Code" pitchFamily="1" charset="0"/>
+                <a:cs typeface="Fira Code" pitchFamily="1" charset="0"/>
+              </a:rPr>
+              <a:t>Създаване</a:t>
+            </a:r>
+            <a:r>
+              <a:rPr lang="ru-RU" sz="2000" dirty="0">
+                <a:latin typeface="Fira Sans" panose="020B0503050000020004" pitchFamily="34" charset="0"/>
+                <a:ea typeface="Fira Code" pitchFamily="1" charset="0"/>
+                <a:cs typeface="Fira Code" pitchFamily="1" charset="0"/>
+              </a:rPr>
+              <a:t> на мрежа от </a:t>
+            </a:r>
+            <a:r>
+              <a:rPr lang="ru-RU" sz="2000" dirty="0" err="1">
+                <a:latin typeface="Fira Sans" panose="020B0503050000020004" pitchFamily="34" charset="0"/>
+                <a:ea typeface="Fira Code" pitchFamily="1" charset="0"/>
+                <a:cs typeface="Fira Code" pitchFamily="1" charset="0"/>
+              </a:rPr>
+              <a:t>изследователски</a:t>
+            </a:r>
+            <a:r>
+              <a:rPr lang="ru-RU" sz="2000" dirty="0">
+                <a:latin typeface="Fira Sans" panose="020B0503050000020004" pitchFamily="34" charset="0"/>
+                <a:ea typeface="Fira Code" pitchFamily="1" charset="0"/>
+                <a:cs typeface="Fira Code" pitchFamily="1" charset="0"/>
+              </a:rPr>
+              <a:t> </a:t>
+            </a:r>
+            <a:r>
+              <a:rPr lang="ru-RU" sz="2000" dirty="0" err="1">
+                <a:latin typeface="Fira Sans" panose="020B0503050000020004" pitchFamily="34" charset="0"/>
+                <a:ea typeface="Fira Code" pitchFamily="1" charset="0"/>
+                <a:cs typeface="Fira Code" pitchFamily="1" charset="0"/>
+              </a:rPr>
+              <a:t>висши</a:t>
+            </a:r>
+            <a:r>
+              <a:rPr lang="ru-RU" sz="2000" dirty="0">
+                <a:latin typeface="Fira Sans" panose="020B0503050000020004" pitchFamily="34" charset="0"/>
+                <a:ea typeface="Fira Code" pitchFamily="1" charset="0"/>
+                <a:cs typeface="Fira Code" pitchFamily="1" charset="0"/>
+              </a:rPr>
+              <a:t> училища на </a:t>
+            </a:r>
+            <a:r>
+              <a:rPr lang="ru-RU" sz="2000" dirty="0" err="1">
+                <a:latin typeface="Fira Sans" panose="020B0503050000020004" pitchFamily="34" charset="0"/>
+                <a:ea typeface="Fira Code" pitchFamily="1" charset="0"/>
+                <a:cs typeface="Fira Code" pitchFamily="1" charset="0"/>
+              </a:rPr>
+              <a:t>Програмата</a:t>
+            </a:r>
+            <a:r>
+              <a:rPr lang="ru-RU" sz="2000" dirty="0">
+                <a:latin typeface="Fira Sans" panose="020B0503050000020004" pitchFamily="34" charset="0"/>
+                <a:ea typeface="Fira Code" pitchFamily="1" charset="0"/>
+                <a:cs typeface="Fira Code" pitchFamily="1" charset="0"/>
+              </a:rPr>
+              <a:t> за </a:t>
+            </a:r>
+            <a:r>
+              <a:rPr lang="ru-RU" sz="2000" dirty="0" err="1">
+                <a:latin typeface="Fira Sans" panose="020B0503050000020004" pitchFamily="34" charset="0"/>
+                <a:ea typeface="Fira Code" pitchFamily="1" charset="0"/>
+                <a:cs typeface="Fira Code" pitchFamily="1" charset="0"/>
+              </a:rPr>
+              <a:t>ускоряване</a:t>
+            </a:r>
+            <a:r>
+              <a:rPr lang="ru-RU" sz="2000" dirty="0">
+                <a:latin typeface="Fira Sans" panose="020B0503050000020004" pitchFamily="34" charset="0"/>
+                <a:ea typeface="Fira Code" pitchFamily="1" charset="0"/>
+                <a:cs typeface="Fira Code" pitchFamily="1" charset="0"/>
+              </a:rPr>
+              <a:t> на </a:t>
+            </a:r>
+            <a:r>
+              <a:rPr lang="ru-RU" sz="2000" dirty="0" err="1">
+                <a:latin typeface="Fira Sans" panose="020B0503050000020004" pitchFamily="34" charset="0"/>
+                <a:ea typeface="Fira Code" pitchFamily="1" charset="0"/>
+                <a:cs typeface="Fira Code" pitchFamily="1" charset="0"/>
+              </a:rPr>
+              <a:t>икономическото</a:t>
+            </a:r>
+            <a:r>
+              <a:rPr lang="ru-RU" sz="2000" dirty="0">
+                <a:latin typeface="Fira Sans" panose="020B0503050000020004" pitchFamily="34" charset="0"/>
+                <a:ea typeface="Fira Code" pitchFamily="1" charset="0"/>
+                <a:cs typeface="Fira Code" pitchFamily="1" charset="0"/>
+              </a:rPr>
+              <a:t> </a:t>
+            </a:r>
+            <a:r>
+              <a:rPr lang="ru-RU" sz="2000" dirty="0" err="1">
+                <a:latin typeface="Fira Sans" panose="020B0503050000020004" pitchFamily="34" charset="0"/>
+                <a:ea typeface="Fira Code" pitchFamily="1" charset="0"/>
+                <a:cs typeface="Fira Code" pitchFamily="1" charset="0"/>
+              </a:rPr>
+              <a:t>възстановяване</a:t>
+            </a:r>
+            <a:r>
+              <a:rPr lang="ru-RU" sz="2000" dirty="0">
+                <a:latin typeface="Fira Sans" panose="020B0503050000020004" pitchFamily="34" charset="0"/>
+                <a:ea typeface="Fira Code" pitchFamily="1" charset="0"/>
+                <a:cs typeface="Fira Code" pitchFamily="1" charset="0"/>
+              </a:rPr>
+              <a:t> и трансформация чрез наука и </a:t>
+            </a:r>
+            <a:r>
+              <a:rPr lang="ru-RU" sz="2000" dirty="0" err="1">
+                <a:latin typeface="Fira Sans" panose="020B0503050000020004" pitchFamily="34" charset="0"/>
+                <a:ea typeface="Fira Code" pitchFamily="1" charset="0"/>
+                <a:cs typeface="Fira Code" pitchFamily="1" charset="0"/>
+              </a:rPr>
+              <a:t>иновации</a:t>
+            </a:r>
+            <a:r>
+              <a:rPr lang="ru-RU" sz="2000" dirty="0">
+                <a:latin typeface="Fira Sans" panose="020B0503050000020004" pitchFamily="34" charset="0"/>
+                <a:ea typeface="Fira Code" pitchFamily="1" charset="0"/>
+                <a:cs typeface="Fira Code" pitchFamily="1" charset="0"/>
+              </a:rPr>
+              <a:t> </a:t>
+            </a:r>
+          </a:p>
+          <a:p>
+            <a:pPr algn="ctr"/>
+            <a:r>
+              <a:rPr lang="ru-RU" sz="2000" dirty="0">
+                <a:latin typeface="Fira Sans" panose="020B0503050000020004" pitchFamily="34" charset="0"/>
+                <a:ea typeface="Fira Code" pitchFamily="1" charset="0"/>
+                <a:cs typeface="Fira Code" pitchFamily="1" charset="0"/>
+              </a:rPr>
+              <a:t>от компонент "</a:t>
+            </a:r>
+            <a:r>
+              <a:rPr lang="ru-RU" sz="2000" dirty="0" err="1">
+                <a:latin typeface="Fira Sans" panose="020B0503050000020004" pitchFamily="34" charset="0"/>
+                <a:ea typeface="Fira Code" pitchFamily="1" charset="0"/>
+                <a:cs typeface="Fira Code" pitchFamily="1" charset="0"/>
+              </a:rPr>
+              <a:t>Иновативна</a:t>
+            </a:r>
+            <a:r>
+              <a:rPr lang="ru-RU" sz="2000" dirty="0">
+                <a:latin typeface="Fira Sans" panose="020B0503050000020004" pitchFamily="34" charset="0"/>
+                <a:ea typeface="Fira Code" pitchFamily="1" charset="0"/>
+                <a:cs typeface="Fira Code" pitchFamily="1" charset="0"/>
+              </a:rPr>
+              <a:t> </a:t>
+            </a:r>
+            <a:r>
+              <a:rPr lang="ru-RU" sz="2000" dirty="0" err="1">
+                <a:latin typeface="Fira Sans" panose="020B0503050000020004" pitchFamily="34" charset="0"/>
+                <a:ea typeface="Fira Code" pitchFamily="1" charset="0"/>
+                <a:cs typeface="Fira Code" pitchFamily="1" charset="0"/>
+              </a:rPr>
+              <a:t>България</a:t>
+            </a:r>
+            <a:r>
+              <a:rPr lang="ru-RU" sz="2000" dirty="0">
+                <a:latin typeface="Fira Sans" panose="020B0503050000020004" pitchFamily="34" charset="0"/>
+                <a:ea typeface="Fira Code" pitchFamily="1" charset="0"/>
+                <a:cs typeface="Fira Code" pitchFamily="1" charset="0"/>
+              </a:rPr>
+              <a:t>" </a:t>
+            </a:r>
+            <a:r>
+              <a:rPr lang="ru-RU" sz="2000" dirty="0" err="1">
+                <a:latin typeface="Fira Sans" panose="020B0503050000020004" pitchFamily="34" charset="0"/>
+                <a:ea typeface="Fira Code" pitchFamily="1" charset="0"/>
+                <a:cs typeface="Fira Code" pitchFamily="1" charset="0"/>
+              </a:rPr>
+              <a:t>Националин</a:t>
+            </a:r>
+            <a:r>
+              <a:rPr lang="ru-RU" sz="2000" dirty="0">
+                <a:latin typeface="Fira Sans" panose="020B0503050000020004" pitchFamily="34" charset="0"/>
+                <a:ea typeface="Fira Code" pitchFamily="1" charset="0"/>
+                <a:cs typeface="Fira Code" pitchFamily="1" charset="0"/>
+              </a:rPr>
+              <a:t> план за </a:t>
+            </a:r>
+            <a:r>
+              <a:rPr lang="ru-RU" sz="2000" dirty="0" err="1">
+                <a:latin typeface="Fira Sans" panose="020B0503050000020004" pitchFamily="34" charset="0"/>
+                <a:ea typeface="Fira Code" pitchFamily="1" charset="0"/>
+                <a:cs typeface="Fira Code" pitchFamily="1" charset="0"/>
+              </a:rPr>
+              <a:t>възстановяване</a:t>
+            </a:r>
+            <a:r>
+              <a:rPr lang="ru-RU" sz="2000" dirty="0">
+                <a:latin typeface="Fira Sans" panose="020B0503050000020004" pitchFamily="34" charset="0"/>
+                <a:ea typeface="Fira Code" pitchFamily="1" charset="0"/>
+                <a:cs typeface="Fira Code" pitchFamily="1" charset="0"/>
+              </a:rPr>
+              <a:t> и </a:t>
+            </a:r>
+            <a:r>
+              <a:rPr lang="ru-RU" sz="2000" dirty="0" err="1">
+                <a:latin typeface="Fira Sans" panose="020B0503050000020004" pitchFamily="34" charset="0"/>
+                <a:ea typeface="Fira Code" pitchFamily="1" charset="0"/>
+                <a:cs typeface="Fira Code" pitchFamily="1" charset="0"/>
+              </a:rPr>
+              <a:t>устойчивост</a:t>
+            </a:r>
+            <a:r>
+              <a:rPr lang="ru-RU" sz="2000" dirty="0">
+                <a:latin typeface="Fira Sans" panose="020B0503050000020004" pitchFamily="34" charset="0"/>
+                <a:ea typeface="Fira Code" pitchFamily="1" charset="0"/>
+                <a:cs typeface="Fira Code" pitchFamily="1" charset="0"/>
+              </a:rPr>
+              <a:t>“, </a:t>
+            </a:r>
+            <a:r>
+              <a:rPr lang="ru-RU" sz="2000" dirty="0" err="1">
+                <a:latin typeface="Fira Sans" panose="020B0503050000020004" pitchFamily="34" charset="0"/>
+                <a:ea typeface="Fira Code" pitchFamily="1" charset="0"/>
+                <a:cs typeface="Fira Code" pitchFamily="1" charset="0"/>
+              </a:rPr>
+              <a:t>финансиран</a:t>
+            </a:r>
+            <a:r>
+              <a:rPr lang="ru-RU" sz="2000" dirty="0">
+                <a:latin typeface="Fira Sans" panose="020B0503050000020004" pitchFamily="34" charset="0"/>
+                <a:ea typeface="Fira Code" pitchFamily="1" charset="0"/>
+                <a:cs typeface="Fira Code" pitchFamily="1" charset="0"/>
+              </a:rPr>
+              <a:t> от </a:t>
+            </a:r>
+            <a:r>
+              <a:rPr lang="ru-RU" sz="2000" dirty="0" err="1">
+                <a:latin typeface="Fira Sans" panose="020B0503050000020004" pitchFamily="34" charset="0"/>
+                <a:ea typeface="Fira Code" pitchFamily="1" charset="0"/>
+                <a:cs typeface="Fira Code" pitchFamily="1" charset="0"/>
+              </a:rPr>
+              <a:t>европейския</a:t>
+            </a:r>
+            <a:r>
+              <a:rPr lang="ru-RU" sz="2000" dirty="0">
+                <a:latin typeface="Fira Sans" panose="020B0503050000020004" pitchFamily="34" charset="0"/>
+                <a:ea typeface="Fira Code" pitchFamily="1" charset="0"/>
+                <a:cs typeface="Fira Code" pitchFamily="1" charset="0"/>
+              </a:rPr>
+              <a:t> </a:t>
+            </a:r>
+            <a:r>
+              <a:rPr lang="ru-RU" sz="2000" dirty="0" err="1">
+                <a:latin typeface="Fira Sans" panose="020B0503050000020004" pitchFamily="34" charset="0"/>
+                <a:ea typeface="Fira Code" pitchFamily="1" charset="0"/>
+                <a:cs typeface="Fira Code" pitchFamily="1" charset="0"/>
+              </a:rPr>
+              <a:t>съюз</a:t>
+            </a:r>
+            <a:r>
+              <a:rPr lang="ru-RU" sz="2000" dirty="0">
+                <a:latin typeface="Fira Sans" panose="020B0503050000020004" pitchFamily="34" charset="0"/>
+                <a:ea typeface="Fira Code" pitchFamily="1" charset="0"/>
+                <a:cs typeface="Fira Code" pitchFamily="1" charset="0"/>
+              </a:rPr>
+              <a:t> - </a:t>
+            </a:r>
+            <a:r>
+              <a:rPr lang="ru-RU" sz="2000" dirty="0" err="1">
+                <a:latin typeface="Fira Sans" panose="020B0503050000020004" pitchFamily="34" charset="0"/>
+                <a:ea typeface="Fira Code" pitchFamily="1" charset="0"/>
+                <a:cs typeface="Fira Code" pitchFamily="1" charset="0"/>
+              </a:rPr>
+              <a:t>NextGenerationEU</a:t>
+            </a:r>
+            <a:endParaRPr lang="ru-RU" sz="2000" dirty="0">
+              <a:latin typeface="Fira Sans" panose="020B0503050000020004" pitchFamily="34" charset="0"/>
+              <a:ea typeface="Fira Code" pitchFamily="1" charset="0"/>
+              <a:cs typeface="Fira Code" pitchFamily="1" charset="0"/>
+            </a:endParaRPr>
+          </a:p>
+        </p:txBody>
+      </p:sp>
+      <p:sp>
+        <p:nvSpPr>
+          <p:cNvPr id="2" name="TextBox 1">
+            <a:extLst>
+              <a:ext uri="{FF2B5EF4-FFF2-40B4-BE49-F238E27FC236}">
+                <a16:creationId xmlns:a16="http://schemas.microsoft.com/office/drawing/2014/main" id="{44E3EA15-795B-2944-AECE-4F650DC392B8}"/>
+              </a:ext>
+            </a:extLst>
+          </p:cNvPr>
+          <p:cNvSpPr txBox="1"/>
+          <p:nvPr/>
+        </p:nvSpPr>
+        <p:spPr>
+          <a:xfrm>
+            <a:off x="1239798" y="24989259"/>
+            <a:ext cx="10443877" cy="523220"/>
+          </a:xfrm>
+          <a:prstGeom prst="rect">
+            <a:avLst/>
+          </a:prstGeom>
+          <a:noFill/>
           <a:ln>
             <a:solidFill>
-              <a:schemeClr val="tx1"/>
+              <a:schemeClr val="tx2">
+                <a:lumMod val="75000"/>
+                <a:lumOff val="25000"/>
+              </a:schemeClr>
             </a:solidFill>
           </a:ln>
         </p:spPr>
-      </p:pic>
+        <p:txBody>
+          <a:bodyPr wrap="square" rtlCol="0">
+            <a:spAutoFit/>
+          </a:bodyPr>
+          <a:lstStyle/>
+          <a:p>
+            <a:r>
+              <a:rPr lang="en-US" sz="2800" i="1" dirty="0">
+                <a:effectLst>
+                  <a:outerShdw blurRad="38100" dist="38100" dir="2700000" algn="tl">
+                    <a:srgbClr val="000000">
+                      <a:alpha val="43137"/>
+                    </a:srgbClr>
+                  </a:outerShdw>
+                </a:effectLst>
+                <a:latin typeface="Fira Sans" panose="020B0503050000020004" pitchFamily="34" charset="0"/>
+              </a:rPr>
+              <a:t>Scan the QR code to find out more for Materials and Methods</a:t>
+            </a:r>
+            <a:endParaRPr lang="bg-BG" sz="2800" dirty="0"/>
+          </a:p>
+        </p:txBody>
+      </p:sp>
     </p:spTree>
     <p:extLst>
       <p:ext uri="{BB962C8B-B14F-4D97-AF65-F5344CB8AC3E}">

</xml_diff>